<commit_message>
Updated Kanban. Added disable option to dropdown
</commit_message>
<xml_diff>
--- a/Electron Brownbag.pptx
+++ b/Electron Brownbag.pptx
@@ -35385,13 +35385,8 @@
           <a:p>
             <a:r>
               <a:rPr lang="en-GB" dirty="0" smtClean="0"/>
-              <a:t>For the next Hackathon we propose the creation of an Electron based, React fronted Hastings Toolkit. Somewhere for all the little applications to live so they can actually be used and easily distributed instead of mostly just being a fun little diversion for a few days</a:t>
-            </a:r>
-            <a:r>
-              <a:rPr lang="en-GB" dirty="0" smtClean="0"/>
-              <a:t>.</a:t>
-            </a:r>
-            <a:endParaRPr lang="en-GB" dirty="0" smtClean="0"/>
+              <a:t>For the next Hackathon we propose the creation of an Electron based, React fronted Hastings Toolkit. Somewhere for all the little applications to live so they can actually be used and easily distributed instead of mostly just being a fun little diversion for a few days.</a:t>
+            </a:r>
           </a:p>
         </p:txBody>
       </p:sp>
@@ -35530,7 +35525,23 @@
           <a:p>
             <a:r>
               <a:rPr lang="en-GB" dirty="0" smtClean="0"/>
-              <a:t>While not set in stone we have some design structures we are working to in an attempt to form a standard design for apps to fit into</a:t>
+              <a:t>While not set in stone we have some design structures we are working to in an attempt to form a standard design for apps to fit </a:t>
+            </a:r>
+            <a:r>
+              <a:rPr lang="en-GB" dirty="0" smtClean="0"/>
+              <a:t>into</a:t>
+            </a:r>
+          </a:p>
+          <a:p>
+            <a:r>
+              <a:rPr lang="en-GB" dirty="0" smtClean="0"/>
+              <a:t>We have set up the testing frameworks needed for each language and created example tests for them.</a:t>
+            </a:r>
+          </a:p>
+          <a:p>
+            <a:r>
+              <a:rPr lang="en-GB" dirty="0" smtClean="0"/>
+              <a:t>It’s a learning experience so there are probably better ways to implement some things which is where the group effort comes in.</a:t>
             </a:r>
             <a:endParaRPr lang="en-GB" dirty="0" smtClean="0"/>
           </a:p>
@@ -35732,7 +35743,7 @@
           </a:prstGeom>
           <a:extLst>
             <a:ext uri="{C572A759-6A51-4108-AA02-DFA0A04FC94B}">
-              <ma14:wrappingTextBoxFlag xmlns="" xmlns:ma14="http://schemas.microsoft.com/office/mac/drawingml/2011/main" val="1"/>
+              <ma14:wrappingTextBoxFlag xmlns:ma14="http://schemas.microsoft.com/office/mac/drawingml/2011/main" xmlns="" val="1"/>
             </a:ext>
           </a:extLst>
         </p:spPr>
@@ -35888,7 +35899,6 @@
               <a:rPr lang="en-GB" sz="1500" dirty="0" smtClean="0"/>
               <a:t>“Hastings Pier”</a:t>
             </a:r>
-            <a:endParaRPr lang="en-GB" sz="1500" dirty="0" smtClean="0"/>
           </a:p>
           <a:p>
             <a:pPr lvl="1"/>
@@ -36130,11 +36140,7 @@
           <a:p>
             <a:r>
               <a:rPr lang="en-GB" dirty="0" smtClean="0"/>
-              <a:t>Simple </a:t>
-            </a:r>
-            <a:r>
-              <a:rPr lang="en-GB" dirty="0" smtClean="0"/>
-              <a:t>distribution</a:t>
+              <a:t>Simple distribution</a:t>
             </a:r>
           </a:p>
           <a:p>
@@ -36142,7 +36148,6 @@
               <a:rPr lang="en-GB" dirty="0" smtClean="0"/>
               <a:t>Easy updating</a:t>
             </a:r>
-            <a:endParaRPr lang="en-GB" dirty="0" smtClean="0"/>
           </a:p>
           <a:p>
             <a:r>
@@ -36739,7 +36744,6 @@
               <a:rPr lang="en-GB" dirty="0" smtClean="0"/>
               <a:t> questions covering lots of variations.</a:t>
             </a:r>
-            <a:endParaRPr lang="en-GB" dirty="0" smtClean="0"/>
           </a:p>
         </p:txBody>
       </p:sp>
@@ -36845,19 +36849,7 @@
             </a:r>
             <a:r>
               <a:rPr lang="en-GB" dirty="0" smtClean="0"/>
-              <a:t> modules for </a:t>
-            </a:r>
-            <a:r>
-              <a:rPr lang="en-GB" dirty="0" smtClean="0"/>
-              <a:t>electron </a:t>
-            </a:r>
-            <a:r>
-              <a:rPr lang="en-GB" dirty="0" smtClean="0"/>
-              <a:t>specifically to simplify things like deployment, updating applications, debugging and </a:t>
-            </a:r>
-            <a:r>
-              <a:rPr lang="en-GB" dirty="0" smtClean="0"/>
-              <a:t>more.</a:t>
+              <a:t> modules for electron specifically to simplify things like deployment, updating applications, debugging and more.</a:t>
             </a:r>
           </a:p>
           <a:p>
@@ -36865,7 +36857,6 @@
               <a:rPr lang="en-GB" dirty="0" smtClean="0"/>
               <a:t>Many react modules available as well for simplifying things.</a:t>
             </a:r>
-            <a:endParaRPr lang="en-GB" dirty="0" smtClean="0"/>
           </a:p>
           <a:p>
             <a:r>

</xml_diff>

<commit_message>
More Burner stuff. Add IProps to Applicationpane
</commit_message>
<xml_diff>
--- a/Electron Brownbag.pptx
+++ b/Electron Brownbag.pptx
@@ -827,21 +827,6 @@
           <a:bodyPr/>
           <a:lstStyle/>
           <a:p>
-            <a:r>
-              <a:rPr lang="en-GB" dirty="0" smtClean="0">
-                <a:hlinkClick r:id="rId3"/>
-              </a:rPr>
-              <a:t>https://electronjs.org/</a:t>
-            </a:r>
-            <a:endParaRPr lang="en-GB" dirty="0" smtClean="0"/>
-          </a:p>
-          <a:p>
-            <a:r>
-              <a:rPr lang="en-GB" dirty="0" smtClean="0">
-                <a:hlinkClick r:id="rId4"/>
-              </a:rPr>
-              <a:t>https://github.com/electron/electron#readme</a:t>
-            </a:r>
             <a:endParaRPr lang="en-GB" dirty="0"/>
           </a:p>
         </p:txBody>
@@ -864,7 +849,7 @@
             <a:fld id="{B8CC9DC2-1B58-4FDA-A1A1-71E24D183C12}" type="slidenum">
               <a:rPr lang="en-GB" smtClean="0"/>
               <a:pPr/>
-              <a:t>3</a:t>
+              <a:t>2</a:t>
             </a:fld>
             <a:endParaRPr lang="en-GB" dirty="0"/>
           </a:p>
@@ -873,7 +858,7 @@
     </p:spTree>
     <p:extLst>
       <p:ext uri="{BB962C8B-B14F-4D97-AF65-F5344CB8AC3E}">
-        <p14:creationId xmlns:p14="http://schemas.microsoft.com/office/powerpoint/2010/main" val="155856561"/>
+        <p14:creationId xmlns:p14="http://schemas.microsoft.com/office/powerpoint/2010/main" val="1133727537"/>
       </p:ext>
     </p:extLst>
   </p:cSld>
@@ -928,16 +913,19 @@
           <a:lstStyle/>
           <a:p>
             <a:r>
-              <a:rPr lang="en-GB" dirty="0" smtClean="0"/>
-              <a:t>We should make a little doc with our app</a:t>
-            </a:r>
-            <a:r>
-              <a:rPr lang="en-GB" baseline="0" dirty="0" smtClean="0"/>
-              <a:t> design things. Like the naming conventions, adding them to the react list, how to get your icon to show up, using the storage. </a:t>
-            </a:r>
-            <a:r>
-              <a:rPr lang="en-GB" baseline="0" smtClean="0"/>
-              <a:t>Things like that</a:t>
+              <a:rPr lang="en-GB" dirty="0" smtClean="0">
+                <a:hlinkClick r:id="rId3"/>
+              </a:rPr>
+              <a:t>https://electronjs.org/</a:t>
+            </a:r>
+            <a:endParaRPr lang="en-GB" dirty="0" smtClean="0"/>
+          </a:p>
+          <a:p>
+            <a:r>
+              <a:rPr lang="en-GB" dirty="0" smtClean="0">
+                <a:hlinkClick r:id="rId4"/>
+              </a:rPr>
+              <a:t>https://github.com/electron/electron#readme</a:t>
             </a:r>
             <a:endParaRPr lang="en-GB" dirty="0"/>
           </a:p>
@@ -961,6 +949,103 @@
             <a:fld id="{B8CC9DC2-1B58-4FDA-A1A1-71E24D183C12}" type="slidenum">
               <a:rPr lang="en-GB" smtClean="0"/>
               <a:pPr/>
+              <a:t>3</a:t>
+            </a:fld>
+            <a:endParaRPr lang="en-GB" dirty="0"/>
+          </a:p>
+        </p:txBody>
+      </p:sp>
+    </p:spTree>
+    <p:extLst>
+      <p:ext uri="{BB962C8B-B14F-4D97-AF65-F5344CB8AC3E}">
+        <p14:creationId xmlns:p14="http://schemas.microsoft.com/office/powerpoint/2010/main" val="155856561"/>
+      </p:ext>
+    </p:extLst>
+  </p:cSld>
+  <p:clrMapOvr>
+    <a:masterClrMapping/>
+  </p:clrMapOvr>
+</p:notes>
+</file>
+
+<file path=ppt/notesSlides/notesSlide4.xml><?xml version="1.0" encoding="utf-8"?>
+<p:notes xmlns:a="http://schemas.openxmlformats.org/drawingml/2006/main" xmlns:r="http://schemas.openxmlformats.org/officeDocument/2006/relationships" xmlns:p="http://schemas.openxmlformats.org/presentationml/2006/main">
+  <p:cSld>
+    <p:spTree>
+      <p:nvGrpSpPr>
+        <p:cNvPr id="1" name=""/>
+        <p:cNvGrpSpPr/>
+        <p:nvPr/>
+      </p:nvGrpSpPr>
+      <p:grpSpPr>
+        <a:xfrm>
+          <a:off x="0" y="0"/>
+          <a:ext cx="0" cy="0"/>
+          <a:chOff x="0" y="0"/>
+          <a:chExt cx="0" cy="0"/>
+        </a:xfrm>
+      </p:grpSpPr>
+      <p:sp>
+        <p:nvSpPr>
+          <p:cNvPr id="2" name="Slide Image Placeholder 1"/>
+          <p:cNvSpPr>
+            <a:spLocks noGrp="1" noRot="1" noChangeAspect="1"/>
+          </p:cNvSpPr>
+          <p:nvPr>
+            <p:ph type="sldImg"/>
+          </p:nvPr>
+        </p:nvSpPr>
+        <p:spPr/>
+      </p:sp>
+      <p:sp>
+        <p:nvSpPr>
+          <p:cNvPr id="3" name="Notes Placeholder 2"/>
+          <p:cNvSpPr>
+            <a:spLocks noGrp="1"/>
+          </p:cNvSpPr>
+          <p:nvPr>
+            <p:ph type="body" idx="1"/>
+          </p:nvPr>
+        </p:nvSpPr>
+        <p:spPr/>
+        <p:txBody>
+          <a:bodyPr/>
+          <a:lstStyle/>
+          <a:p>
+            <a:r>
+              <a:rPr lang="en-GB" dirty="0" smtClean="0"/>
+              <a:t>We should make a little doc with our app</a:t>
+            </a:r>
+            <a:r>
+              <a:rPr lang="en-GB" baseline="0" dirty="0" smtClean="0"/>
+              <a:t> design things. Like the naming conventions, adding them to the react list, how to get your icon to show up, using the storage. </a:t>
+            </a:r>
+            <a:r>
+              <a:rPr lang="en-GB" baseline="0" smtClean="0"/>
+              <a:t>Things like that</a:t>
+            </a:r>
+            <a:endParaRPr lang="en-GB" dirty="0"/>
+          </a:p>
+        </p:txBody>
+      </p:sp>
+      <p:sp>
+        <p:nvSpPr>
+          <p:cNvPr id="4" name="Slide Number Placeholder 3"/>
+          <p:cNvSpPr>
+            <a:spLocks noGrp="1"/>
+          </p:cNvSpPr>
+          <p:nvPr>
+            <p:ph type="sldNum" sz="quarter" idx="10"/>
+          </p:nvPr>
+        </p:nvSpPr>
+        <p:spPr/>
+        <p:txBody>
+          <a:bodyPr/>
+          <a:lstStyle/>
+          <a:p>
+            <a:fld id="{B8CC9DC2-1B58-4FDA-A1A1-71E24D183C12}" type="slidenum">
+              <a:rPr lang="en-GB" smtClean="0"/>
+              <a:pPr/>
               <a:t>11</a:t>
             </a:fld>
             <a:endParaRPr lang="en-GB" dirty="0"/>
@@ -971,6 +1056,91 @@
     <p:extLst>
       <p:ext uri="{BB962C8B-B14F-4D97-AF65-F5344CB8AC3E}">
         <p14:creationId xmlns:p14="http://schemas.microsoft.com/office/powerpoint/2010/main" val="2399511822"/>
+      </p:ext>
+    </p:extLst>
+  </p:cSld>
+  <p:clrMapOvr>
+    <a:masterClrMapping/>
+  </p:clrMapOvr>
+</p:notes>
+</file>
+
+<file path=ppt/notesSlides/notesSlide5.xml><?xml version="1.0" encoding="utf-8"?>
+<p:notes xmlns:a="http://schemas.openxmlformats.org/drawingml/2006/main" xmlns:r="http://schemas.openxmlformats.org/officeDocument/2006/relationships" xmlns:p="http://schemas.openxmlformats.org/presentationml/2006/main">
+  <p:cSld>
+    <p:spTree>
+      <p:nvGrpSpPr>
+        <p:cNvPr id="1" name=""/>
+        <p:cNvGrpSpPr/>
+        <p:nvPr/>
+      </p:nvGrpSpPr>
+      <p:grpSpPr>
+        <a:xfrm>
+          <a:off x="0" y="0"/>
+          <a:ext cx="0" cy="0"/>
+          <a:chOff x="0" y="0"/>
+          <a:chExt cx="0" cy="0"/>
+        </a:xfrm>
+      </p:grpSpPr>
+      <p:sp>
+        <p:nvSpPr>
+          <p:cNvPr id="2" name="Slide Image Placeholder 1"/>
+          <p:cNvSpPr>
+            <a:spLocks noGrp="1" noRot="1" noChangeAspect="1"/>
+          </p:cNvSpPr>
+          <p:nvPr>
+            <p:ph type="sldImg"/>
+          </p:nvPr>
+        </p:nvSpPr>
+        <p:spPr/>
+      </p:sp>
+      <p:sp>
+        <p:nvSpPr>
+          <p:cNvPr id="3" name="Notes Placeholder 2"/>
+          <p:cNvSpPr>
+            <a:spLocks noGrp="1"/>
+          </p:cNvSpPr>
+          <p:nvPr>
+            <p:ph type="body" idx="1"/>
+          </p:nvPr>
+        </p:nvSpPr>
+        <p:spPr/>
+        <p:txBody>
+          <a:bodyPr/>
+          <a:lstStyle/>
+          <a:p>
+            <a:endParaRPr lang="en-GB" dirty="0"/>
+          </a:p>
+        </p:txBody>
+      </p:sp>
+      <p:sp>
+        <p:nvSpPr>
+          <p:cNvPr id="4" name="Slide Number Placeholder 3"/>
+          <p:cNvSpPr>
+            <a:spLocks noGrp="1"/>
+          </p:cNvSpPr>
+          <p:nvPr>
+            <p:ph type="sldNum" sz="quarter" idx="10"/>
+          </p:nvPr>
+        </p:nvSpPr>
+        <p:spPr/>
+        <p:txBody>
+          <a:bodyPr/>
+          <a:lstStyle/>
+          <a:p>
+            <a:fld id="{B8CC9DC2-1B58-4FDA-A1A1-71E24D183C12}" type="slidenum">
+              <a:rPr lang="en-GB" smtClean="0"/>
+              <a:pPr/>
+              <a:t>12</a:t>
+            </a:fld>
+            <a:endParaRPr lang="en-GB" dirty="0"/>
+          </a:p>
+        </p:txBody>
+      </p:sp>
+    </p:spTree>
+    <p:extLst>
+      <p:ext uri="{BB962C8B-B14F-4D97-AF65-F5344CB8AC3E}">
+        <p14:creationId xmlns:p14="http://schemas.microsoft.com/office/powerpoint/2010/main" val="450827335"/>
       </p:ext>
     </p:extLst>
   </p:cSld>
@@ -35525,11 +35695,7 @@
           <a:p>
             <a:r>
               <a:rPr lang="en-GB" dirty="0" smtClean="0"/>
-              <a:t>While not set in stone we have some design structures we are working to in an attempt to form a standard design for apps to fit </a:t>
-            </a:r>
-            <a:r>
-              <a:rPr lang="en-GB" dirty="0" smtClean="0"/>
-              <a:t>into</a:t>
+              <a:t>While not set in stone we have some design structures we are working to in an attempt to form a standard design for apps to fit into</a:t>
             </a:r>
           </a:p>
           <a:p>
@@ -35543,7 +35709,6 @@
               <a:rPr lang="en-GB" dirty="0" smtClean="0"/>
               <a:t>It’s a learning experience so there are probably better ways to implement some things which is where the group effort comes in.</a:t>
             </a:r>
-            <a:endParaRPr lang="en-GB" dirty="0" smtClean="0"/>
           </a:p>
         </p:txBody>
       </p:sp>
@@ -35602,7 +35767,7 @@
           </p:nvPr>
         </p:nvPicPr>
         <p:blipFill>
-          <a:blip r:embed="rId4"/>
+          <a:blip r:embed="rId5"/>
           <a:stretch>
             <a:fillRect/>
           </a:stretch>
@@ -35743,7 +35908,7 @@
           </a:prstGeom>
           <a:extLst>
             <a:ext uri="{C572A759-6A51-4108-AA02-DFA0A04FC94B}">
-              <ma14:wrappingTextBoxFlag xmlns:ma14="http://schemas.microsoft.com/office/mac/drawingml/2011/main" xmlns="" val="1"/>
+              <ma14:wrappingTextBoxFlag xmlns="" xmlns:ma14="http://schemas.microsoft.com/office/mac/drawingml/2011/main" val="1"/>
             </a:ext>
           </a:extLst>
         </p:spPr>
@@ -36730,11 +36895,16 @@
               <a:rPr lang="en-GB" dirty="0" smtClean="0"/>
               <a:t>Java</a:t>
             </a:r>
+            <a:endParaRPr lang="en-GB" dirty="0" smtClean="0"/>
           </a:p>
           <a:p>
             <a:r>
               <a:rPr lang="en-GB" dirty="0" smtClean="0"/>
-              <a:t>Being a popular and open platform there are plenty of tutorials and </a:t>
+              <a:t>Being </a:t>
+            </a:r>
+            <a:r>
+              <a:rPr lang="en-GB" dirty="0" smtClean="0"/>
+              <a:t>a popular and open platform there are plenty of tutorials and </a:t>
             </a:r>
             <a:r>
               <a:rPr lang="en-GB" dirty="0" err="1" smtClean="0"/>

</xml_diff>

<commit_message>
added notes to brownbag
</commit_message>
<xml_diff>
--- a/Electron Brownbag.pptx
+++ b/Electron Brownbag.pptx
@@ -262,7 +262,7 @@
             <a:fld id="{B4B40DF5-17F0-43C5-A7AE-65A758E8AB63}" type="datetimeFigureOut">
               <a:rPr lang="nl-NL" smtClean="0"/>
               <a:pPr/>
-              <a:t>26-11-2019</a:t>
+              <a:t>27-11-2019</a:t>
             </a:fld>
             <a:endParaRPr lang="nl-NL"/>
           </a:p>
@@ -429,7 +429,7 @@
             <a:fld id="{4418180F-FD92-4DD4-B279-0771E404DD71}" type="datetimeFigureOut">
               <a:rPr lang="en-GB" smtClean="0"/>
               <a:pPr/>
-              <a:t>26/11/2019</a:t>
+              <a:t>27/11/2019</a:t>
             </a:fld>
             <a:endParaRPr lang="en-GB" dirty="0"/>
           </a:p>
@@ -742,7 +742,11 @@
           <a:bodyPr/>
           <a:lstStyle/>
           <a:p>
-            <a:endParaRPr lang="en-GB"/>
+            <a:r>
+              <a:rPr lang="en-GB" dirty="0" smtClean="0"/>
+              <a:t>Electron actually straightforward </a:t>
+            </a:r>
+            <a:endParaRPr lang="en-GB" dirty="0"/>
           </a:p>
         </p:txBody>
       </p:sp>
@@ -927,7 +931,152 @@
               </a:rPr>
               <a:t>https://github.com/electron/electron#readme</a:t>
             </a:r>
-            <a:endParaRPr lang="en-GB" dirty="0"/>
+            <a:endParaRPr lang="en-GB" dirty="0" smtClean="0"/>
+          </a:p>
+          <a:p>
+            <a:endParaRPr lang="en-GB" dirty="0" smtClean="0"/>
+          </a:p>
+          <a:p>
+            <a:pPr marL="0" marR="0" lvl="0" indent="0" algn="l" defTabSz="914400" rtl="0" eaLnBrk="1" fontAlgn="auto" latinLnBrk="0" hangingPunct="1">
+              <a:lnSpc>
+                <a:spcPct val="100000"/>
+              </a:lnSpc>
+              <a:spcBef>
+                <a:spcPts val="0"/>
+              </a:spcBef>
+              <a:spcAft>
+                <a:spcPts val="0"/>
+              </a:spcAft>
+              <a:buClrTx/>
+              <a:buSzTx/>
+              <a:buFontTx/>
+              <a:buNone/>
+              <a:tabLst/>
+              <a:defRPr/>
+            </a:pPr>
+            <a:r>
+              <a:rPr lang="en-GB" dirty="0" smtClean="0"/>
+              <a:t>We</a:t>
+            </a:r>
+            <a:r>
+              <a:rPr lang="en-GB" baseline="0" dirty="0" smtClean="0"/>
+              <a:t> have set up the same application on a windows 10, 7 and mac. On the website they also say that they support Linux. It was pretty much download build then go</a:t>
+            </a:r>
+          </a:p>
+          <a:p>
+            <a:pPr marL="0" marR="0" lvl="0" indent="0" algn="l" defTabSz="914400" rtl="0" eaLnBrk="1" fontAlgn="auto" latinLnBrk="0" hangingPunct="1">
+              <a:lnSpc>
+                <a:spcPct val="100000"/>
+              </a:lnSpc>
+              <a:spcBef>
+                <a:spcPts val="0"/>
+              </a:spcBef>
+              <a:spcAft>
+                <a:spcPts val="0"/>
+              </a:spcAft>
+              <a:buClrTx/>
+              <a:buSzTx/>
+              <a:buFontTx/>
+              <a:buNone/>
+              <a:tabLst/>
+              <a:defRPr/>
+            </a:pPr>
+            <a:endParaRPr lang="en-GB" baseline="0" dirty="0" smtClean="0"/>
+          </a:p>
+          <a:p>
+            <a:pPr marL="0" marR="0" lvl="0" indent="0" algn="l" defTabSz="914400" rtl="0" eaLnBrk="1" fontAlgn="auto" latinLnBrk="0" hangingPunct="1">
+              <a:lnSpc>
+                <a:spcPct val="100000"/>
+              </a:lnSpc>
+              <a:spcBef>
+                <a:spcPts val="0"/>
+              </a:spcBef>
+              <a:spcAft>
+                <a:spcPts val="0"/>
+              </a:spcAft>
+              <a:buClrTx/>
+              <a:buSzTx/>
+              <a:buFontTx/>
+              <a:buNone/>
+              <a:tabLst/>
+              <a:defRPr/>
+            </a:pPr>
+            <a:r>
+              <a:rPr lang="en-GB" baseline="0" dirty="0" smtClean="0"/>
+              <a:t>In essence it </a:t>
+            </a:r>
+            <a:r>
+              <a:rPr lang="en-GB" baseline="0" dirty="0" smtClean="0"/>
+              <a:t>allows </a:t>
+            </a:r>
+            <a:r>
+              <a:rPr lang="en-GB" baseline="0" dirty="0" smtClean="0"/>
+              <a:t>you to build a web frontend in a desktop application. This means that you don’t need to learn a new </a:t>
+            </a:r>
+            <a:r>
+              <a:rPr lang="en-GB" baseline="0" dirty="0" err="1" smtClean="0"/>
+              <a:t>ui</a:t>
+            </a:r>
+            <a:r>
+              <a:rPr lang="en-GB" baseline="0" dirty="0" smtClean="0"/>
+              <a:t> tech to build a desktop app, you can reuse your websites code, or even simply present your website as a desktop app.</a:t>
+            </a:r>
+          </a:p>
+          <a:p>
+            <a:pPr marL="0" marR="0" lvl="0" indent="0" algn="l" defTabSz="914400" rtl="0" eaLnBrk="1" fontAlgn="auto" latinLnBrk="0" hangingPunct="1">
+              <a:lnSpc>
+                <a:spcPct val="100000"/>
+              </a:lnSpc>
+              <a:spcBef>
+                <a:spcPts val="0"/>
+              </a:spcBef>
+              <a:spcAft>
+                <a:spcPts val="0"/>
+              </a:spcAft>
+              <a:buClrTx/>
+              <a:buSzTx/>
+              <a:buFontTx/>
+              <a:buNone/>
+              <a:tabLst/>
+              <a:defRPr/>
+            </a:pPr>
+            <a:endParaRPr lang="en-GB" dirty="0" smtClean="0"/>
+          </a:p>
+          <a:p>
+            <a:pPr marL="0" marR="0" lvl="0" indent="0" algn="l" defTabSz="914400" rtl="0" eaLnBrk="1" fontAlgn="auto" latinLnBrk="0" hangingPunct="1">
+              <a:lnSpc>
+                <a:spcPct val="100000"/>
+              </a:lnSpc>
+              <a:spcBef>
+                <a:spcPts val="0"/>
+              </a:spcBef>
+              <a:spcAft>
+                <a:spcPts val="0"/>
+              </a:spcAft>
+              <a:buClrTx/>
+              <a:buSzTx/>
+              <a:buFontTx/>
+              <a:buNone/>
+              <a:tabLst/>
+              <a:defRPr/>
+            </a:pPr>
+            <a:r>
+              <a:rPr lang="en-GB" dirty="0" smtClean="0"/>
+              <a:t>We</a:t>
+            </a:r>
+            <a:r>
+              <a:rPr lang="en-GB" baseline="0" dirty="0" smtClean="0"/>
+              <a:t> chose react because we like it and it is where we are going and also </a:t>
+            </a:r>
+            <a:r>
+              <a:rPr lang="en-GB" baseline="0" dirty="0" err="1" smtClean="0"/>
+              <a:t>TypeScript</a:t>
+            </a:r>
+            <a:r>
+              <a:rPr lang="en-GB" baseline="0" dirty="0" smtClean="0"/>
+              <a:t> </a:t>
+            </a:r>
+            <a:endParaRPr lang="en-GB" dirty="0" smtClean="0"/>
           </a:p>
         </p:txBody>
       </p:sp>
@@ -1012,6 +1161,91 @@
           <a:bodyPr/>
           <a:lstStyle/>
           <a:p>
+            <a:endParaRPr lang="en-GB" dirty="0"/>
+          </a:p>
+        </p:txBody>
+      </p:sp>
+      <p:sp>
+        <p:nvSpPr>
+          <p:cNvPr id="4" name="Slide Number Placeholder 3"/>
+          <p:cNvSpPr>
+            <a:spLocks noGrp="1"/>
+          </p:cNvSpPr>
+          <p:nvPr>
+            <p:ph type="sldNum" sz="quarter" idx="10"/>
+          </p:nvPr>
+        </p:nvSpPr>
+        <p:spPr/>
+        <p:txBody>
+          <a:bodyPr/>
+          <a:lstStyle/>
+          <a:p>
+            <a:fld id="{B8CC9DC2-1B58-4FDA-A1A1-71E24D183C12}" type="slidenum">
+              <a:rPr lang="en-GB" smtClean="0"/>
+              <a:pPr/>
+              <a:t>4</a:t>
+            </a:fld>
+            <a:endParaRPr lang="en-GB" dirty="0"/>
+          </a:p>
+        </p:txBody>
+      </p:sp>
+    </p:spTree>
+    <p:extLst>
+      <p:ext uri="{BB962C8B-B14F-4D97-AF65-F5344CB8AC3E}">
+        <p14:creationId xmlns:p14="http://schemas.microsoft.com/office/powerpoint/2010/main" val="2696392658"/>
+      </p:ext>
+    </p:extLst>
+  </p:cSld>
+  <p:clrMapOvr>
+    <a:masterClrMapping/>
+  </p:clrMapOvr>
+</p:notes>
+</file>
+
+<file path=ppt/notesSlides/notesSlide5.xml><?xml version="1.0" encoding="utf-8"?>
+<p:notes xmlns:a="http://schemas.openxmlformats.org/drawingml/2006/main" xmlns:r="http://schemas.openxmlformats.org/officeDocument/2006/relationships" xmlns:p="http://schemas.openxmlformats.org/presentationml/2006/main">
+  <p:cSld>
+    <p:spTree>
+      <p:nvGrpSpPr>
+        <p:cNvPr id="1" name=""/>
+        <p:cNvGrpSpPr/>
+        <p:nvPr/>
+      </p:nvGrpSpPr>
+      <p:grpSpPr>
+        <a:xfrm>
+          <a:off x="0" y="0"/>
+          <a:ext cx="0" cy="0"/>
+          <a:chOff x="0" y="0"/>
+          <a:chExt cx="0" cy="0"/>
+        </a:xfrm>
+      </p:grpSpPr>
+      <p:sp>
+        <p:nvSpPr>
+          <p:cNvPr id="2" name="Slide Image Placeholder 1"/>
+          <p:cNvSpPr>
+            <a:spLocks noGrp="1" noRot="1" noChangeAspect="1"/>
+          </p:cNvSpPr>
+          <p:nvPr>
+            <p:ph type="sldImg"/>
+          </p:nvPr>
+        </p:nvSpPr>
+        <p:spPr/>
+      </p:sp>
+      <p:sp>
+        <p:nvSpPr>
+          <p:cNvPr id="3" name="Notes Placeholder 2"/>
+          <p:cNvSpPr>
+            <a:spLocks noGrp="1"/>
+          </p:cNvSpPr>
+          <p:nvPr>
+            <p:ph type="body" idx="1"/>
+          </p:nvPr>
+        </p:nvSpPr>
+        <p:spPr/>
+        <p:txBody>
+          <a:bodyPr/>
+          <a:lstStyle/>
+          <a:p>
             <a:r>
               <a:rPr lang="en-GB" dirty="0" smtClean="0"/>
               <a:t>We should make a little doc with our app</a:t>
@@ -1065,7 +1299,7 @@
 </p:notes>
 </file>
 
-<file path=ppt/notesSlides/notesSlide5.xml><?xml version="1.0" encoding="utf-8"?>
+<file path=ppt/notesSlides/notesSlide6.xml><?xml version="1.0" encoding="utf-8"?>
 <p:notes xmlns:a="http://schemas.openxmlformats.org/drawingml/2006/main" xmlns:r="http://schemas.openxmlformats.org/officeDocument/2006/relationships" xmlns:p="http://schemas.openxmlformats.org/presentationml/2006/main">
   <p:cSld>
     <p:spTree>
@@ -34441,7 +34675,7 @@
               <a:pPr algn="r">
                 <a:defRPr/>
               </a:pPr>
-              <a:t>26/11/2019</a:t>
+              <a:t>27/11/2019</a:t>
             </a:fld>
             <a:endParaRPr lang="en-GB" sz="1000" dirty="0">
               <a:solidFill>
@@ -34881,7 +35115,7 @@
               <a:pPr algn="r">
                 <a:defRPr/>
               </a:pPr>
-              <a:t>26/11/2019</a:t>
+              <a:t>27/11/2019</a:t>
             </a:fld>
             <a:endParaRPr lang="en-GB" sz="1000" dirty="0">
               <a:solidFill>
@@ -36154,21 +36388,20 @@
           <a:p>
             <a:r>
               <a:rPr lang="en-GB" dirty="0" smtClean="0"/>
-              <a:t>Electron is a cross platform framework which allows you to build desktop applications with web technologies.</a:t>
-            </a:r>
-          </a:p>
-          <a:p>
-            <a:pPr lvl="1"/>
+              <a:t>Electron is a cross platform framework which allows you to build desktop applications.</a:t>
+            </a:r>
+          </a:p>
+          <a:p>
+            <a:endParaRPr lang="en-GB" dirty="0" smtClean="0"/>
+          </a:p>
+          <a:p>
             <a:r>
               <a:rPr lang="en-GB" dirty="0" smtClean="0"/>
-              <a:t>The same application can be packaged with small/no changes for Windows, Mac and Linux.</a:t>
-            </a:r>
-          </a:p>
-          <a:p>
-            <a:r>
-              <a:rPr lang="en-GB" dirty="0" smtClean="0"/>
-              <a:t>Allows you to use web technologies to make a UI for an application which can have desktop functions not normally allowed by the web such as file reading/writing.</a:t>
-            </a:r>
+              <a:t>Allows you to use web technologies to make a UI for an application which can have desktop</a:t>
+            </a:r>
+          </a:p>
+          <a:p>
+            <a:endParaRPr lang="en-GB" dirty="0" smtClean="0"/>
           </a:p>
           <a:p>
             <a:r>
@@ -36285,6 +36518,25 @@
           <a:bodyPr/>
           <a:lstStyle/>
           <a:p>
+            <a:pPr marL="0" indent="0">
+              <a:buNone/>
+            </a:pPr>
+            <a:r>
+              <a:rPr lang="en-GB" dirty="0" smtClean="0"/>
+              <a:t>Advantages</a:t>
+            </a:r>
+          </a:p>
+          <a:p>
+            <a:pPr marL="0" indent="0">
+              <a:buNone/>
+            </a:pPr>
+            <a:r>
+              <a:rPr lang="en-GB" dirty="0" smtClean="0"/>
+              <a:t>Its is like a website hosted locally with access to your operating system</a:t>
+            </a:r>
+            <a:endParaRPr lang="en-GB" dirty="0"/>
+          </a:p>
+          <a:p>
             <a:r>
               <a:rPr lang="en-GB" dirty="0" smtClean="0"/>
               <a:t>Desktop notifications for events triggered on the web</a:t>
@@ -36305,21 +36557,53 @@
           <a:p>
             <a:r>
               <a:rPr lang="en-GB" dirty="0" smtClean="0"/>
-              <a:t>Simple distribution</a:t>
-            </a:r>
-          </a:p>
-          <a:p>
+              <a:t>Simple </a:t>
+            </a:r>
             <a:r>
               <a:rPr lang="en-GB" dirty="0" smtClean="0"/>
-              <a:t>Easy updating</a:t>
+              <a:t>distribution</a:t>
             </a:r>
           </a:p>
           <a:p>
             <a:r>
               <a:rPr lang="en-GB" dirty="0" smtClean="0"/>
-              <a:t>Large support network of developers</a:t>
-            </a:r>
-            <a:endParaRPr lang="en-GB" dirty="0"/>
+              <a:t>Large </a:t>
+            </a:r>
+            <a:r>
+              <a:rPr lang="en-GB" dirty="0" smtClean="0"/>
+              <a:t>support network of developers</a:t>
+            </a:r>
+          </a:p>
+          <a:p>
+            <a:r>
+              <a:rPr lang="en-GB" dirty="0" smtClean="0"/>
+              <a:t>Web technologies are continually being updated</a:t>
+            </a:r>
+          </a:p>
+          <a:p>
+            <a:pPr marL="0" indent="0">
+              <a:buNone/>
+            </a:pPr>
+            <a:r>
+              <a:rPr lang="en-GB" dirty="0" smtClean="0"/>
+              <a:t>Disadvantages</a:t>
+            </a:r>
+          </a:p>
+          <a:p>
+            <a:r>
+              <a:rPr lang="en-GB" dirty="0" smtClean="0"/>
+              <a:t>Large Size – Each electron app has its own copy of chromium</a:t>
+            </a:r>
+          </a:p>
+          <a:p>
+            <a:r>
+              <a:rPr lang="en-GB" dirty="0"/>
+              <a:t>Resources </a:t>
+            </a:r>
+            <a:r>
+              <a:rPr lang="en-GB" dirty="0" smtClean="0"/>
+              <a:t>hogging – Chromium is quite hungry</a:t>
+            </a:r>
           </a:p>
         </p:txBody>
       </p:sp>
@@ -36436,6 +36720,16 @@
             <a:r>
               <a:rPr lang="en-GB" dirty="0" smtClean="0"/>
               <a:t>GitHub Desktop</a:t>
+            </a:r>
+          </a:p>
+          <a:p>
+            <a:r>
+              <a:rPr lang="en-GB" dirty="0" err="1" smtClean="0"/>
+              <a:t>Wordpress</a:t>
+            </a:r>
+            <a:r>
+              <a:rPr lang="en-GB" dirty="0" smtClean="0"/>
+              <a:t> Desktop App</a:t>
             </a:r>
             <a:endParaRPr lang="en-GB" dirty="0"/>
           </a:p>
@@ -36895,16 +37189,11 @@
               <a:rPr lang="en-GB" dirty="0" smtClean="0"/>
               <a:t>Java</a:t>
             </a:r>
-            <a:endParaRPr lang="en-GB" dirty="0" smtClean="0"/>
           </a:p>
           <a:p>
             <a:r>
               <a:rPr lang="en-GB" dirty="0" smtClean="0"/>
-              <a:t>Being </a:t>
-            </a:r>
-            <a:r>
-              <a:rPr lang="en-GB" dirty="0" smtClean="0"/>
-              <a:t>a popular and open platform there are plenty of tutorials and </a:t>
+              <a:t>Being a popular and open platform there are plenty of tutorials and </a:t>
             </a:r>
             <a:r>
               <a:rPr lang="en-GB" dirty="0" err="1" smtClean="0"/>

</xml_diff>

<commit_message>
Fix of split screen issue
</commit_message>
<xml_diff>
--- a/Electron Brownbag.pptx
+++ b/Electron Brownbag.pptx
@@ -11,10 +11,10 @@
     <p:sldMasterId id="2147483801" r:id="rId7"/>
   </p:sldMasterIdLst>
   <p:notesMasterIdLst>
-    <p:notesMasterId r:id="rId20"/>
+    <p:notesMasterId r:id="rId21"/>
   </p:notesMasterIdLst>
   <p:handoutMasterIdLst>
-    <p:handoutMasterId r:id="rId21"/>
+    <p:handoutMasterId r:id="rId22"/>
   </p:handoutMasterIdLst>
   <p:sldIdLst>
     <p:sldId id="269" r:id="rId8"/>
@@ -28,7 +28,8 @@
     <p:sldId id="275" r:id="rId16"/>
     <p:sldId id="276" r:id="rId17"/>
     <p:sldId id="278" r:id="rId18"/>
-    <p:sldId id="279" r:id="rId19"/>
+    <p:sldId id="280" r:id="rId19"/>
+    <p:sldId id="279" r:id="rId20"/>
   </p:sldIdLst>
   <p:sldSz cx="9144000" cy="6858000" type="screen4x3"/>
   <p:notesSz cx="6742113" cy="9872663"/>
@@ -928,6 +929,10 @@
           <a:bodyPr/>
           <a:lstStyle/>
           <a:p>
+            <a:r>
+              <a:rPr lang="en-GB" dirty="0" smtClean="0"/>
+              <a:t>If demo isn’t working, use video.</a:t>
+            </a:r>
             <a:endParaRPr lang="en-GB" dirty="0"/>
           </a:p>
         </p:txBody>
@@ -951,6 +956,91 @@
               <a:rPr lang="en-GB" smtClean="0"/>
               <a:pPr/>
               <a:t>12</a:t>
+            </a:fld>
+            <a:endParaRPr lang="en-GB" dirty="0"/>
+          </a:p>
+        </p:txBody>
+      </p:sp>
+    </p:spTree>
+    <p:extLst>
+      <p:ext uri="{BB962C8B-B14F-4D97-AF65-F5344CB8AC3E}">
+        <p14:creationId xmlns:p14="http://schemas.microsoft.com/office/powerpoint/2010/main" val="3045673817"/>
+      </p:ext>
+    </p:extLst>
+  </p:cSld>
+  <p:clrMapOvr>
+    <a:masterClrMapping/>
+  </p:clrMapOvr>
+</p:notes>
+</file>
+
+<file path=ppt/notesSlides/notesSlide12.xml><?xml version="1.0" encoding="utf-8"?>
+<p:notes xmlns:a="http://schemas.openxmlformats.org/drawingml/2006/main" xmlns:r="http://schemas.openxmlformats.org/officeDocument/2006/relationships" xmlns:p="http://schemas.openxmlformats.org/presentationml/2006/main">
+  <p:cSld>
+    <p:spTree>
+      <p:nvGrpSpPr>
+        <p:cNvPr id="1" name=""/>
+        <p:cNvGrpSpPr/>
+        <p:nvPr/>
+      </p:nvGrpSpPr>
+      <p:grpSpPr>
+        <a:xfrm>
+          <a:off x="0" y="0"/>
+          <a:ext cx="0" cy="0"/>
+          <a:chOff x="0" y="0"/>
+          <a:chExt cx="0" cy="0"/>
+        </a:xfrm>
+      </p:grpSpPr>
+      <p:sp>
+        <p:nvSpPr>
+          <p:cNvPr id="2" name="Slide Image Placeholder 1"/>
+          <p:cNvSpPr>
+            <a:spLocks noGrp="1" noRot="1" noChangeAspect="1"/>
+          </p:cNvSpPr>
+          <p:nvPr>
+            <p:ph type="sldImg"/>
+          </p:nvPr>
+        </p:nvSpPr>
+        <p:spPr/>
+      </p:sp>
+      <p:sp>
+        <p:nvSpPr>
+          <p:cNvPr id="3" name="Notes Placeholder 2"/>
+          <p:cNvSpPr>
+            <a:spLocks noGrp="1"/>
+          </p:cNvSpPr>
+          <p:nvPr>
+            <p:ph type="body" idx="1"/>
+          </p:nvPr>
+        </p:nvSpPr>
+        <p:spPr/>
+        <p:txBody>
+          <a:bodyPr/>
+          <a:lstStyle/>
+          <a:p>
+            <a:endParaRPr lang="en-GB" dirty="0"/>
+          </a:p>
+        </p:txBody>
+      </p:sp>
+      <p:sp>
+        <p:nvSpPr>
+          <p:cNvPr id="4" name="Slide Number Placeholder 3"/>
+          <p:cNvSpPr>
+            <a:spLocks noGrp="1"/>
+          </p:cNvSpPr>
+          <p:nvPr>
+            <p:ph type="sldNum" sz="quarter" idx="10"/>
+          </p:nvPr>
+        </p:nvSpPr>
+        <p:spPr/>
+        <p:txBody>
+          <a:bodyPr/>
+          <a:lstStyle/>
+          <a:p>
+            <a:fld id="{B8CC9DC2-1B58-4FDA-A1A1-71E24D183C12}" type="slidenum">
+              <a:rPr lang="en-GB" smtClean="0"/>
+              <a:pPr/>
+              <a:t>13</a:t>
             </a:fld>
             <a:endParaRPr lang="en-GB" dirty="0"/>
           </a:p>
@@ -1142,13 +1232,8 @@
             </a:r>
             <a:r>
               <a:rPr lang="en-GB" baseline="0" dirty="0" smtClean="0"/>
-              <a:t> have set up the same application on a windows 10, 7 and mac. On the website they also say that they support Linux. It was pretty much download build then </a:t>
-            </a:r>
-            <a:r>
-              <a:rPr lang="en-GB" baseline="0" dirty="0" smtClean="0"/>
-              <a:t>go. </a:t>
-            </a:r>
-            <a:endParaRPr lang="en-GB" baseline="0" dirty="0" smtClean="0"/>
+              <a:t> have set up the same application on a windows 10, 7 and mac. On the website they also say that they support Linux. It was pretty much download build then go. </a:t>
+            </a:r>
           </a:p>
           <a:p>
             <a:pPr marL="0" marR="0" lvl="0" indent="0" algn="l" defTabSz="914400" rtl="0" eaLnBrk="1" fontAlgn="auto" latinLnBrk="0" hangingPunct="1">
@@ -1245,15 +1330,35 @@
             </a:r>
             <a:r>
               <a:rPr lang="en-GB" baseline="0" dirty="0" smtClean="0"/>
-              <a:t> chose react because we like it and it is where we are going and also </a:t>
+              <a:t> chose react because </a:t>
+            </a:r>
+            <a:r>
+              <a:rPr lang="en-GB" baseline="0" dirty="0" smtClean="0"/>
+              <a:t>it </a:t>
+            </a:r>
+            <a:r>
+              <a:rPr lang="en-GB" baseline="0" dirty="0" smtClean="0"/>
+              <a:t>is where </a:t>
+            </a:r>
+            <a:r>
+              <a:rPr lang="en-GB" baseline="0" dirty="0" smtClean="0"/>
+              <a:t>we as a company </a:t>
+            </a:r>
+            <a:r>
+              <a:rPr lang="en-GB" baseline="0" dirty="0" smtClean="0"/>
+              <a:t>are </a:t>
+            </a:r>
+            <a:r>
+              <a:rPr lang="en-GB" baseline="0" dirty="0" smtClean="0"/>
+              <a:t>going and we like it. </a:t>
             </a:r>
             <a:r>
               <a:rPr lang="en-GB" baseline="0" dirty="0" err="1" smtClean="0"/>
-              <a:t>TypeScript</a:t>
+              <a:t>Typscript</a:t>
             </a:r>
             <a:r>
               <a:rPr lang="en-GB" baseline="0" dirty="0" smtClean="0"/>
-              <a:t> </a:t>
+              <a:t> makes sense as it is strongly linked to React.</a:t>
             </a:r>
             <a:endParaRPr lang="en-GB" dirty="0" smtClean="0"/>
           </a:p>
@@ -1431,7 +1536,15 @@
             </a:r>
             <a:r>
               <a:rPr lang="en-GB" baseline="0" dirty="0" smtClean="0"/>
-              <a:t> in previous hackathons Room booking, </a:t>
+              <a:t> in previous </a:t>
+            </a:r>
+            <a:r>
+              <a:rPr lang="en-GB" baseline="0" dirty="0" smtClean="0"/>
+              <a:t>hackathons? </a:t>
+            </a:r>
+            <a:r>
+              <a:rPr lang="en-GB" baseline="0" dirty="0" smtClean="0"/>
+              <a:t>Room booking, </a:t>
             </a:r>
             <a:r>
               <a:rPr lang="en-GB" baseline="0" dirty="0" err="1" smtClean="0"/>
@@ -1439,15 +1552,15 @@
             </a:r>
             <a:r>
               <a:rPr lang="en-GB" baseline="0" dirty="0" smtClean="0"/>
-              <a:t>, …. These may be really useful tools but they haven’t been picked up. </a:t>
+              <a:t>, …. These may be really useful tools but they haven’t been picked up. This includes our projects that at the time we thought were really </a:t>
             </a:r>
             <a:r>
               <a:rPr lang="en-GB" baseline="0" dirty="0" smtClean="0"/>
-              <a:t>This includes our projects that at the time we thought were really useful Automation Octane. It is quite demoralising when they go no further. </a:t>
+              <a:t>useful. </a:t>
             </a:r>
             <a:r>
               <a:rPr lang="en-GB" baseline="0" dirty="0" smtClean="0"/>
-              <a:t>Why is this? Well we think we need to lower the barrier for setup, distribution and adoption. </a:t>
+              <a:t>Automation Octane. It is quite demoralising when they go no further. Why is this? Well we think we need to lower the barrier for setup, distribution and adoption. </a:t>
             </a:r>
           </a:p>
           <a:p>
@@ -1765,13 +1878,8 @@
             </a:r>
             <a:r>
               <a:rPr lang="en-GB" baseline="0" dirty="0" smtClean="0"/>
-              <a:t> more like a statically typed language such as JAVA or C#. We are using pure TS as the backend to our project. </a:t>
-            </a:r>
-            <a:r>
-              <a:rPr lang="en-GB" baseline="0" dirty="0" smtClean="0"/>
-              <a:t>This makes it much easier to see errors before running the program.</a:t>
-            </a:r>
-            <a:endParaRPr lang="en-GB" baseline="0" dirty="0" smtClean="0"/>
+              <a:t> more like a statically typed language such as JAVA or C#. We are using pure TS as the backend to our project. This makes it much easier to see errors before running the program.</a:t>
+            </a:r>
           </a:p>
           <a:p>
             <a:endParaRPr lang="en-GB" dirty="0" smtClean="0"/>
@@ -1824,11 +1932,7 @@
             </a:r>
             <a:r>
               <a:rPr lang="en-GB" baseline="0" dirty="0" smtClean="0"/>
-              <a:t> then only updates what is required. While this sounds like a lot of steps it only ever means what is required is updated and is a quick </a:t>
-            </a:r>
-            <a:r>
-              <a:rPr lang="en-GB" baseline="0" dirty="0" smtClean="0"/>
-              <a:t>process</a:t>
+              <a:t> then only updates what is required. While this sounds like a lot of steps it only ever means what is required is updated and is a quick process</a:t>
             </a:r>
           </a:p>
           <a:p>
@@ -36654,11 +36758,7 @@
           <a:p>
             <a:r>
               <a:rPr lang="en-GB" dirty="0" smtClean="0"/>
-              <a:t>Our </a:t>
-            </a:r>
-            <a:r>
-              <a:rPr lang="en-GB" dirty="0" smtClean="0"/>
-              <a:t>experience</a:t>
+              <a:t>Our experience</a:t>
             </a:r>
             <a:endParaRPr lang="en-GB" dirty="0"/>
           </a:p>
@@ -36713,15 +36813,7 @@
           <a:p>
             <a:r>
               <a:rPr lang="en-GB" dirty="0" smtClean="0"/>
-              <a:t>Many </a:t>
-            </a:r>
-            <a:r>
-              <a:rPr lang="en-GB" dirty="0" smtClean="0"/>
-              <a:t>react modules </a:t>
-            </a:r>
-            <a:r>
-              <a:rPr lang="en-GB" dirty="0" smtClean="0"/>
-              <a:t>available</a:t>
+              <a:t>Many react modules available</a:t>
             </a:r>
           </a:p>
           <a:p>
@@ -36741,7 +36833,6 @@
               <a:rPr lang="en-GB" dirty="0" smtClean="0"/>
               <a:t>Can be challenging to structure (nicely)</a:t>
             </a:r>
-            <a:endParaRPr lang="en-GB" dirty="0" smtClean="0"/>
           </a:p>
         </p:txBody>
       </p:sp>
@@ -36886,13 +36977,29 @@
           <a:p>
             <a:r>
               <a:rPr lang="en-GB" dirty="0" smtClean="0"/>
-              <a:t>We have set up the testing frameworks needed for each language and created example tests for them.</a:t>
-            </a:r>
-          </a:p>
-          <a:p>
+              <a:t>We have </a:t>
+            </a:r>
             <a:r>
               <a:rPr lang="en-GB" dirty="0" smtClean="0"/>
-              <a:t>It’s a learning experience so there are probably better ways to implement some things which is where the group effort comes in.</a:t>
+              <a:t>started to set </a:t>
+            </a:r>
+            <a:r>
+              <a:rPr lang="en-GB" dirty="0" smtClean="0"/>
+              <a:t>up the testing frameworks needed for each language and created example tests for them.</a:t>
+            </a:r>
+          </a:p>
+          <a:p>
+            <a:r>
+              <a:rPr lang="en-GB" dirty="0" smtClean="0"/>
+              <a:t>It’s a learning experience so there </a:t>
+            </a:r>
+            <a:r>
+              <a:rPr lang="en-GB" dirty="0" smtClean="0"/>
+              <a:t>almost certainly better </a:t>
+            </a:r>
+            <a:r>
+              <a:rPr lang="en-GB" dirty="0" smtClean="0"/>
+              <a:t>ways to implement some things which is where the group effort comes in.</a:t>
             </a:r>
           </a:p>
         </p:txBody>
@@ -36918,6 +37025,147 @@
 </file>
 
 <file path=ppt/slides/slide12.xml><?xml version="1.0" encoding="utf-8"?>
+<p:sld xmlns:a="http://schemas.openxmlformats.org/drawingml/2006/main" xmlns:r="http://schemas.openxmlformats.org/officeDocument/2006/relationships" xmlns:p="http://schemas.openxmlformats.org/presentationml/2006/main">
+  <p:cSld>
+    <p:spTree>
+      <p:nvGrpSpPr>
+        <p:cNvPr id="1" name=""/>
+        <p:cNvGrpSpPr/>
+        <p:nvPr/>
+      </p:nvGrpSpPr>
+      <p:grpSpPr>
+        <a:xfrm>
+          <a:off x="0" y="0"/>
+          <a:ext cx="0" cy="0"/>
+          <a:chOff x="0" y="0"/>
+          <a:chExt cx="0" cy="0"/>
+        </a:xfrm>
+      </p:grpSpPr>
+      <p:sp>
+        <p:nvSpPr>
+          <p:cNvPr id="2" name="Text Placeholder 1"/>
+          <p:cNvSpPr>
+            <a:spLocks noGrp="1"/>
+          </p:cNvSpPr>
+          <p:nvPr>
+            <p:ph type="body" sz="quarter" idx="13"/>
+          </p:nvPr>
+        </p:nvSpPr>
+        <p:spPr/>
+        <p:txBody>
+          <a:bodyPr/>
+          <a:lstStyle/>
+          <a:p>
+            <a:r>
+              <a:rPr lang="en-GB" dirty="0" smtClean="0"/>
+              <a:t>Debugging the app</a:t>
+            </a:r>
+            <a:endParaRPr lang="en-GB" dirty="0"/>
+          </a:p>
+        </p:txBody>
+      </p:sp>
+      <p:sp>
+        <p:nvSpPr>
+          <p:cNvPr id="3" name="Text Placeholder 2"/>
+          <p:cNvSpPr>
+            <a:spLocks noGrp="1"/>
+          </p:cNvSpPr>
+          <p:nvPr>
+            <p:ph type="body" sz="quarter" idx="14"/>
+          </p:nvPr>
+        </p:nvSpPr>
+        <p:spPr>
+          <a:xfrm>
+            <a:off x="531044" y="962948"/>
+            <a:ext cx="8092800" cy="5346372"/>
+          </a:xfrm>
+        </p:spPr>
+        <p:txBody>
+          <a:bodyPr/>
+          <a:lstStyle/>
+          <a:p>
+            <a:r>
+              <a:rPr lang="en-GB" dirty="0" smtClean="0"/>
+              <a:t>Electron apps are generally broken into 2 parts.</a:t>
+            </a:r>
+          </a:p>
+          <a:p>
+            <a:pPr lvl="1"/>
+            <a:r>
+              <a:rPr lang="en-GB" dirty="0" smtClean="0"/>
+              <a:t>Main process – Where the connection to the OS is and where the backend languages typically interact. Acts like the web backend.</a:t>
+            </a:r>
+          </a:p>
+          <a:p>
+            <a:pPr lvl="1"/>
+            <a:r>
+              <a:rPr lang="en-GB" dirty="0" smtClean="0"/>
+              <a:t>Render Process – Where the bit which is displayed is controlled. Treated largely like a website.</a:t>
+            </a:r>
+            <a:endParaRPr lang="en-GB" dirty="0"/>
+          </a:p>
+          <a:p>
+            <a:r>
+              <a:rPr lang="en-GB" dirty="0" smtClean="0"/>
+              <a:t>Debugging of the render process can be done using the built in chromium dev tools.</a:t>
+            </a:r>
+          </a:p>
+          <a:p>
+            <a:r>
+              <a:rPr lang="en-GB" dirty="0" smtClean="0"/>
+              <a:t>The main process can only be debugged in an IDE.</a:t>
+            </a:r>
+          </a:p>
+          <a:p>
+            <a:r>
+              <a:rPr lang="en-GB" dirty="0" smtClean="0"/>
+              <a:t>We have created a debugging profile which allows for both to be debugged in VS code at the same time.</a:t>
+            </a:r>
+            <a:endParaRPr lang="en-GB" dirty="0"/>
+          </a:p>
+          <a:p>
+            <a:r>
+              <a:rPr lang="en-GB" dirty="0" smtClean="0"/>
+              <a:t>Can integrate React Dev tools</a:t>
+            </a:r>
+          </a:p>
+          <a:p>
+            <a:r>
+              <a:rPr lang="en-GB" dirty="0" smtClean="0"/>
+              <a:t>Electron has a debug tool called </a:t>
+            </a:r>
+            <a:r>
+              <a:rPr lang="en-GB" dirty="0" err="1" smtClean="0"/>
+              <a:t>Devtron</a:t>
+            </a:r>
+            <a:r>
+              <a:rPr lang="en-GB" dirty="0" smtClean="0"/>
+              <a:t>.</a:t>
+            </a:r>
+          </a:p>
+        </p:txBody>
+      </p:sp>
+    </p:spTree>
+    <p:extLst>
+      <p:ext uri="{BB962C8B-B14F-4D97-AF65-F5344CB8AC3E}">
+        <p14:creationId xmlns:p14="http://schemas.microsoft.com/office/powerpoint/2010/main" val="456410058"/>
+      </p:ext>
+    </p:extLst>
+  </p:cSld>
+  <p:clrMapOvr>
+    <a:masterClrMapping/>
+  </p:clrMapOvr>
+  <p:timing>
+    <p:tnLst>
+      <p:par>
+        <p:cTn id="1" dur="indefinite" restart="never" nodeType="tmRoot"/>
+      </p:par>
+    </p:tnLst>
+  </p:timing>
+</p:sld>
+</file>
+
+<file path=ppt/slides/slide13.xml><?xml version="1.0" encoding="utf-8"?>
 <p:sld xmlns:a="http://schemas.openxmlformats.org/drawingml/2006/main" xmlns:r="http://schemas.openxmlformats.org/officeDocument/2006/relationships" xmlns:p="http://schemas.openxmlformats.org/presentationml/2006/main">
   <p:cSld>
     <p:spTree>
@@ -37093,7 +37341,7 @@
           </a:prstGeom>
           <a:extLst>
             <a:ext uri="{C572A759-6A51-4108-AA02-DFA0A04FC94B}">
-              <ma14:wrappingTextBoxFlag xmlns="" xmlns:ma14="http://schemas.microsoft.com/office/mac/drawingml/2011/main" val="1"/>
+              <ma14:wrappingTextBoxFlag xmlns:ma14="http://schemas.microsoft.com/office/mac/drawingml/2011/main" xmlns="" val="1"/>
             </a:ext>
           </a:extLst>
         </p:spPr>
@@ -37339,11 +37587,7 @@
           <a:p>
             <a:r>
               <a:rPr lang="en-GB" dirty="0" smtClean="0"/>
-              <a:t>Electron is a cross platform framework which allows you to build desktop </a:t>
-            </a:r>
-            <a:r>
-              <a:rPr lang="en-GB" dirty="0" smtClean="0"/>
-              <a:t>applications for Linux, Windows or </a:t>
+              <a:t>Electron is a cross platform framework which allows you to build desktop applications for Linux, Windows or </a:t>
             </a:r>
             <a:r>
               <a:rPr lang="en-GB" dirty="0" err="1" smtClean="0"/>
@@ -37353,21 +37597,15 @@
               <a:rPr lang="en-GB" dirty="0" smtClean="0"/>
               <a:t>.</a:t>
             </a:r>
+          </a:p>
+          <a:p>
             <a:endParaRPr lang="en-GB" dirty="0" smtClean="0"/>
           </a:p>
           <a:p>
-            <a:endParaRPr lang="en-GB" dirty="0" smtClean="0"/>
-          </a:p>
-          <a:p>
             <a:r>
               <a:rPr lang="en-GB" dirty="0" smtClean="0"/>
-              <a:t>Allows you to use web technologies to make a UI for </a:t>
-            </a:r>
-            <a:r>
-              <a:rPr lang="en-GB" dirty="0" smtClean="0"/>
-              <a:t>a desktop application</a:t>
-            </a:r>
-            <a:endParaRPr lang="en-GB" dirty="0" smtClean="0"/>
+              <a:t>Allows you to use web technologies to make a UI for a desktop application</a:t>
+            </a:r>
           </a:p>
           <a:p>
             <a:endParaRPr lang="en-GB" dirty="0" smtClean="0"/>
@@ -37507,24 +37745,16 @@
           <a:p>
             <a:r>
               <a:rPr lang="en-GB" dirty="0" smtClean="0"/>
-              <a:t>Visual Studio </a:t>
-            </a:r>
+              <a:t>Visual Studio Code</a:t>
+            </a:r>
+          </a:p>
+          <a:p>
+            <a:endParaRPr lang="en-GB" dirty="0" smtClean="0"/>
+          </a:p>
+          <a:p>
             <a:r>
               <a:rPr lang="en-GB" dirty="0" smtClean="0"/>
-              <a:t>Code</a:t>
-            </a:r>
-          </a:p>
-          <a:p>
-            <a:endParaRPr lang="en-GB" dirty="0" smtClean="0"/>
-          </a:p>
-          <a:p>
-            <a:r>
-              <a:rPr lang="en-GB" dirty="0" smtClean="0"/>
-              <a:t>WhatsApp </a:t>
-            </a:r>
-            <a:r>
-              <a:rPr lang="en-GB" dirty="0" smtClean="0"/>
-              <a:t>Desktop</a:t>
+              <a:t>WhatsApp Desktop</a:t>
             </a:r>
           </a:p>
           <a:p>
@@ -37542,11 +37772,7 @@
           <a:p>
             <a:r>
               <a:rPr lang="en-GB" dirty="0" smtClean="0"/>
-              <a:t>GitHub </a:t>
-            </a:r>
-            <a:r>
-              <a:rPr lang="en-GB" dirty="0" smtClean="0"/>
-              <a:t>Desktop</a:t>
+              <a:t>GitHub Desktop</a:t>
             </a:r>
           </a:p>
           <a:p>
@@ -37653,7 +37879,6 @@
               <a:rPr lang="en-GB" dirty="0" smtClean="0"/>
               <a:t>them.</a:t>
             </a:r>
-            <a:endParaRPr lang="en-GB" dirty="0" smtClean="0"/>
           </a:p>
           <a:p>
             <a:endParaRPr lang="en-GB" dirty="0"/>
@@ -37661,11 +37886,7 @@
           <a:p>
             <a:r>
               <a:rPr lang="en-GB" dirty="0" smtClean="0"/>
-              <a:t>For this Hackathon </a:t>
-            </a:r>
-            <a:r>
-              <a:rPr lang="en-GB" dirty="0" smtClean="0"/>
-              <a:t>we propose the creation of an Electron based, React fronted Hastings Toolkit. Somewhere for all the little applications to live so they can actually be used and easily distributed instead of mostly just being a fun little diversion for a few days</a:t>
+              <a:t>For this Hackathon we propose the creation of an Electron based, React fronted Hastings Toolkit. Somewhere for all the little applications to live so they can actually be used and easily distributed instead of mostly just being a fun little diversion for a few days</a:t>
             </a:r>
             <a:r>
               <a:rPr lang="en-GB" dirty="0"/>
@@ -37699,7 +37920,11 @@
             </a:r>
             <a:r>
               <a:rPr lang="en-GB" dirty="0" smtClean="0"/>
-              <a:t>up*(but wont work today)</a:t>
+              <a:t>up*(but wont work </a:t>
+            </a:r>
+            <a:r>
+              <a:rPr lang="en-GB" dirty="0" smtClean="0"/>
+              <a:t>today per sods law)</a:t>
             </a:r>
             <a:endParaRPr lang="en-GB" dirty="0"/>
           </a:p>
@@ -37947,21 +38172,13 @@
           <a:p>
             <a:r>
               <a:rPr lang="en-GB" dirty="0" smtClean="0"/>
-              <a:t>Desktop </a:t>
-            </a:r>
+              <a:t>Desktop notifications for events triggered on the web</a:t>
+            </a:r>
+          </a:p>
+          <a:p>
             <a:r>
               <a:rPr lang="en-GB" dirty="0" smtClean="0"/>
-              <a:t>notifications for events triggered on the web</a:t>
-            </a:r>
-          </a:p>
-          <a:p>
-            <a:r>
-              <a:rPr lang="en-GB" dirty="0" smtClean="0"/>
-              <a:t>Updating </a:t>
-            </a:r>
-            <a:r>
-              <a:rPr lang="en-GB" dirty="0" smtClean="0"/>
-              <a:t>client applications automatically</a:t>
+              <a:t>Updating client applications automatically</a:t>
             </a:r>
           </a:p>
           <a:p>
@@ -37979,11 +38196,7 @@
           <a:p>
             <a:r>
               <a:rPr lang="en-GB" dirty="0" smtClean="0"/>
-              <a:t>Web technologies are continually being </a:t>
-            </a:r>
-            <a:r>
-              <a:rPr lang="en-GB" dirty="0" smtClean="0"/>
-              <a:t>updated</a:t>
+              <a:t>Web technologies are continually being updated</a:t>
             </a:r>
           </a:p>
           <a:p>
@@ -37991,7 +38204,6 @@
               <a:rPr lang="en-GB" dirty="0" smtClean="0"/>
               <a:t>Cross platform nature expands user base</a:t>
             </a:r>
-            <a:endParaRPr lang="en-GB" dirty="0" smtClean="0"/>
           </a:p>
           <a:p>
             <a:pPr marL="0" indent="0">
@@ -38015,17 +38227,8 @@
             </a:r>
             <a:r>
               <a:rPr lang="en-GB" dirty="0" smtClean="0"/>
-              <a:t>hungry </a:t>
-            </a:r>
-            <a:r>
-              <a:rPr lang="en-GB" dirty="0" smtClean="0"/>
-              <a:t>– </a:t>
-            </a:r>
-            <a:r>
-              <a:rPr lang="en-GB" dirty="0" smtClean="0"/>
-              <a:t>But if you can run chrome you can run an electron application.</a:t>
-            </a:r>
-            <a:endParaRPr lang="en-GB" dirty="0" smtClean="0"/>
+              <a:t>hungry – But if you can run chrome you can run an electron application.</a:t>
+            </a:r>
           </a:p>
         </p:txBody>
       </p:sp>
@@ -38091,11 +38294,7 @@
             </a:r>
             <a:r>
               <a:rPr lang="en-GB" dirty="0" smtClean="0"/>
-              <a:t> </a:t>
-            </a:r>
-            <a:r>
-              <a:rPr lang="en-GB" dirty="0" smtClean="0"/>
-              <a:t>and Electron</a:t>
+              <a:t> and Electron</a:t>
             </a:r>
             <a:endParaRPr lang="en-GB" dirty="0"/>
           </a:p>
@@ -38522,7 +38721,6 @@
               <a:rPr lang="en-GB" dirty="0" smtClean="0"/>
               <a:t>)</a:t>
             </a:r>
-            <a:endParaRPr lang="en-GB" dirty="0" smtClean="0"/>
           </a:p>
           <a:p>
             <a:r>

</xml_diff>

<commit_message>
sorting spectron test. Brownbag Update
</commit_message>
<xml_diff>
--- a/Electron Brownbag.pptx
+++ b/Electron Brownbag.pptx
@@ -263,7 +263,7 @@
             <a:fld id="{B4B40DF5-17F0-43C5-A7AE-65A758E8AB63}" type="datetimeFigureOut">
               <a:rPr lang="nl-NL" smtClean="0"/>
               <a:pPr/>
-              <a:t>3-12-2019</a:t>
+              <a:t>4-12-2019</a:t>
             </a:fld>
             <a:endParaRPr lang="nl-NL"/>
           </a:p>
@@ -430,7 +430,7 @@
             <a:fld id="{4418180F-FD92-4DD4-B279-0771E404DD71}" type="datetimeFigureOut">
               <a:rPr lang="en-GB" smtClean="0"/>
               <a:pPr/>
-              <a:t>03/12/2019</a:t>
+              <a:t>04/12/2019</a:t>
             </a:fld>
             <a:endParaRPr lang="en-GB" dirty="0"/>
           </a:p>
@@ -1330,27 +1330,7 @@
             </a:r>
             <a:r>
               <a:rPr lang="en-GB" baseline="0" dirty="0" smtClean="0"/>
-              <a:t> chose react because </a:t>
-            </a:r>
-            <a:r>
-              <a:rPr lang="en-GB" baseline="0" dirty="0" smtClean="0"/>
-              <a:t>it </a:t>
-            </a:r>
-            <a:r>
-              <a:rPr lang="en-GB" baseline="0" dirty="0" smtClean="0"/>
-              <a:t>is where </a:t>
-            </a:r>
-            <a:r>
-              <a:rPr lang="en-GB" baseline="0" dirty="0" smtClean="0"/>
-              <a:t>we as a company </a:t>
-            </a:r>
-            <a:r>
-              <a:rPr lang="en-GB" baseline="0" dirty="0" smtClean="0"/>
-              <a:t>are </a:t>
-            </a:r>
-            <a:r>
-              <a:rPr lang="en-GB" baseline="0" dirty="0" smtClean="0"/>
-              <a:t>going and we like it. </a:t>
+              <a:t> chose react because it is where we as a company are going and we like it. </a:t>
             </a:r>
             <a:r>
               <a:rPr lang="en-GB" baseline="0" dirty="0" err="1" smtClean="0"/>
@@ -1536,15 +1516,7 @@
             </a:r>
             <a:r>
               <a:rPr lang="en-GB" baseline="0" dirty="0" smtClean="0"/>
-              <a:t> in previous </a:t>
-            </a:r>
-            <a:r>
-              <a:rPr lang="en-GB" baseline="0" dirty="0" smtClean="0"/>
-              <a:t>hackathons? </a:t>
-            </a:r>
-            <a:r>
-              <a:rPr lang="en-GB" baseline="0" dirty="0" smtClean="0"/>
-              <a:t>Room booking, </a:t>
+              <a:t> in previous hackathons? Room booking, </a:t>
             </a:r>
             <a:r>
               <a:rPr lang="en-GB" baseline="0" dirty="0" err="1" smtClean="0"/>
@@ -1552,15 +1524,7 @@
             </a:r>
             <a:r>
               <a:rPr lang="en-GB" baseline="0" dirty="0" smtClean="0"/>
-              <a:t>, …. These may be really useful tools but they haven’t been picked up. This includes our projects that at the time we thought were really </a:t>
-            </a:r>
-            <a:r>
-              <a:rPr lang="en-GB" baseline="0" dirty="0" smtClean="0"/>
-              <a:t>useful. </a:t>
-            </a:r>
-            <a:r>
-              <a:rPr lang="en-GB" baseline="0" dirty="0" smtClean="0"/>
-              <a:t>Automation Octane. It is quite demoralising when they go no further. Why is this? Well we think we need to lower the barrier for setup, distribution and adoption. </a:t>
+              <a:t>, …. These may be really useful tools but they haven’t been picked up. This includes our projects that at the time we thought were really useful. Automation Octane. It is quite demoralising when they go no further. Why is this? Well we think we need to lower the barrier for setup, distribution and adoption. </a:t>
             </a:r>
           </a:p>
           <a:p>
@@ -2095,6 +2059,31 @@
               <a:rPr lang="en-GB" baseline="0" dirty="0" smtClean="0"/>
               <a:t> and Java. </a:t>
             </a:r>
+            <a:r>
+              <a:rPr lang="en-GB" baseline="0" dirty="0" smtClean="0"/>
+              <a:t>There are several ways to use a different language to do the bulk of your backend. The early octane burner used C# and communicated with the main electron process through a third party module which acted like an </a:t>
+            </a:r>
+            <a:r>
+              <a:rPr lang="en-GB" baseline="0" dirty="0" err="1" smtClean="0"/>
+              <a:t>api</a:t>
+            </a:r>
+            <a:r>
+              <a:rPr lang="en-GB" baseline="0" dirty="0" smtClean="0"/>
+              <a:t>. This worked but was slow with large amounts of data being sent. It also had the disadvantage of needing to </a:t>
+            </a:r>
+            <a:r>
+              <a:rPr lang="en-GB" baseline="0" dirty="0" err="1" smtClean="0"/>
+              <a:t>stringify</a:t>
+            </a:r>
+            <a:r>
+              <a:rPr lang="en-GB" baseline="0" dirty="0" smtClean="0"/>
+              <a:t> any objects being sent </a:t>
+            </a:r>
+            <a:r>
+              <a:rPr lang="en-GB" baseline="0" smtClean="0"/>
+              <a:t>or received.</a:t>
+            </a:r>
+            <a:endParaRPr lang="en-GB" baseline="0" dirty="0" smtClean="0"/>
           </a:p>
           <a:p>
             <a:endParaRPr lang="en-GB" baseline="0" dirty="0" smtClean="0"/>
@@ -35696,7 +35685,7 @@
               <a:pPr algn="r">
                 <a:defRPr/>
               </a:pPr>
-              <a:t>03/12/2019</a:t>
+              <a:t>04/12/2019</a:t>
             </a:fld>
             <a:endParaRPr lang="en-GB" sz="1000" dirty="0">
               <a:solidFill>
@@ -36136,7 +36125,7 @@
               <a:pPr algn="r">
                 <a:defRPr/>
               </a:pPr>
-              <a:t>03/12/2019</a:t>
+              <a:t>04/12/2019</a:t>
             </a:fld>
             <a:endParaRPr lang="en-GB" sz="1000" dirty="0">
               <a:solidFill>
@@ -36831,8 +36820,19 @@
           <a:p>
             <a:r>
               <a:rPr lang="en-GB" dirty="0" smtClean="0"/>
-              <a:t>Can be challenging to structure (nicely)</a:t>
-            </a:r>
+              <a:t>Can be challenging to structure (nicely</a:t>
+            </a:r>
+            <a:r>
+              <a:rPr lang="en-GB" dirty="0" smtClean="0"/>
+              <a:t>)</a:t>
+            </a:r>
+          </a:p>
+          <a:p>
+            <a:r>
+              <a:rPr lang="en-GB" dirty="0" smtClean="0"/>
+              <a:t>The firewall can get in the way of some functions but nothing which we have not been able to work around.</a:t>
+            </a:r>
+            <a:endParaRPr lang="en-GB" dirty="0" smtClean="0"/>
           </a:p>
         </p:txBody>
       </p:sp>
@@ -36977,29 +36977,13 @@
           <a:p>
             <a:r>
               <a:rPr lang="en-GB" dirty="0" smtClean="0"/>
-              <a:t>We have </a:t>
-            </a:r>
+              <a:t>We have started to set up the testing frameworks needed for each language and created example tests for them.</a:t>
+            </a:r>
+          </a:p>
+          <a:p>
             <a:r>
               <a:rPr lang="en-GB" dirty="0" smtClean="0"/>
-              <a:t>started to set </a:t>
-            </a:r>
-            <a:r>
-              <a:rPr lang="en-GB" dirty="0" smtClean="0"/>
-              <a:t>up the testing frameworks needed for each language and created example tests for them.</a:t>
-            </a:r>
-          </a:p>
-          <a:p>
-            <a:r>
-              <a:rPr lang="en-GB" dirty="0" smtClean="0"/>
-              <a:t>It’s a learning experience so there </a:t>
-            </a:r>
-            <a:r>
-              <a:rPr lang="en-GB" dirty="0" smtClean="0"/>
-              <a:t>almost certainly better </a:t>
-            </a:r>
-            <a:r>
-              <a:rPr lang="en-GB" dirty="0" smtClean="0"/>
-              <a:t>ways to implement some things which is where the group effort comes in.</a:t>
+              <a:t>It’s a learning experience so there almost certainly better ways to implement some things which is where the group effort comes in.</a:t>
             </a:r>
           </a:p>
         </p:txBody>
@@ -37184,7 +37168,7 @@
       </p:grpSpPr>
       <p:pic>
         <p:nvPicPr>
-          <p:cNvPr id="5" name="2019-11-26 10-28-27">
+          <p:cNvPr id="2" name="2019-12-04 15-08-23">
             <a:hlinkClick r:id="" action="ppaction://media"/>
           </p:cNvPr>
           <p:cNvPicPr>
@@ -37207,7 +37191,7 @@
         </p:blipFill>
         <p:spPr>
           <a:xfrm>
-            <a:off x="0" y="980728"/>
+            <a:off x="0" y="1268760"/>
             <a:ext cx="9144000" cy="5143500"/>
           </a:xfrm>
           <a:prstGeom prst="rect">
@@ -37235,7 +37219,7 @@
                 <p:stCondLst>
                   <p:cond evt="onClick" delay="0">
                     <p:tgtEl>
-                      <p:spTgt spid="5"/>
+                      <p:spTgt spid="2"/>
                     </p:tgtEl>
                   </p:cond>
                 </p:stCondLst>
@@ -37265,7 +37249,7 @@
                                       <p:cBhvr>
                                         <p:cTn id="6" dur="1" fill="hold"/>
                                         <p:tgtEl>
-                                          <p:spTgt spid="5"/>
+                                          <p:spTgt spid="2"/>
                                         </p:tgtEl>
                                       </p:cBhvr>
                                     </p:cmd>
@@ -37283,7 +37267,7 @@
               <p:nextCondLst>
                 <p:cond evt="onClick" delay="0">
                   <p:tgtEl>
-                    <p:spTgt spid="5"/>
+                    <p:spTgt spid="2"/>
                   </p:tgtEl>
                 </p:cond>
               </p:nextCondLst>
@@ -37296,7 +37280,7 @@
                   </p:stCondLst>
                 </p:cTn>
                 <p:tgtEl>
-                  <p:spTgt spid="5"/>
+                  <p:spTgt spid="2"/>
                 </p:tgtEl>
               </p:cMediaNode>
             </p:video>
@@ -37341,7 +37325,7 @@
           </a:prstGeom>
           <a:extLst>
             <a:ext uri="{C572A759-6A51-4108-AA02-DFA0A04FC94B}">
-              <ma14:wrappingTextBoxFlag xmlns:ma14="http://schemas.microsoft.com/office/mac/drawingml/2011/main" xmlns="" val="1"/>
+              <ma14:wrappingTextBoxFlag xmlns="" xmlns:ma14="http://schemas.microsoft.com/office/mac/drawingml/2011/main" val="1"/>
             </a:ext>
           </a:extLst>
         </p:spPr>
@@ -37391,21 +37375,22 @@
           <a:p>
             <a:r>
               <a:rPr lang="en-GB" sz="1500" dirty="0" smtClean="0"/>
-              <a:t>What is Electron?</a:t>
+              <a:t>What is Electron</a:t>
+            </a:r>
+            <a:r>
+              <a:rPr lang="en-GB" sz="1500" dirty="0" smtClean="0"/>
+              <a:t>?</a:t>
             </a:r>
           </a:p>
           <a:p>
             <a:pPr lvl="1"/>
             <a:r>
               <a:rPr lang="en-GB" sz="1500" dirty="0" smtClean="0"/>
-              <a:t>Intro</a:t>
-            </a:r>
-          </a:p>
-          <a:p>
-            <a:pPr lvl="1"/>
+              <a:t>Example </a:t>
+            </a:r>
             <a:r>
               <a:rPr lang="en-GB" sz="1500" dirty="0" smtClean="0"/>
-              <a:t>Example applications on the market</a:t>
+              <a:t>applications on the market</a:t>
             </a:r>
           </a:p>
           <a:p>
@@ -37920,11 +37905,7 @@
             </a:r>
             <a:r>
               <a:rPr lang="en-GB" dirty="0" smtClean="0"/>
-              <a:t>up*(but wont work </a:t>
-            </a:r>
-            <a:r>
-              <a:rPr lang="en-GB" dirty="0" smtClean="0"/>
-              <a:t>today per sods law)</a:t>
+              <a:t>up*(but wont work today per sods law)</a:t>
             </a:r>
             <a:endParaRPr lang="en-GB" dirty="0"/>
           </a:p>
@@ -37946,61 +37927,6 @@
               <a:buNone/>
             </a:pPr>
             <a:endParaRPr lang="en-GB" dirty="0" smtClean="0"/>
-          </a:p>
-        </p:txBody>
-      </p:sp>
-      <p:sp>
-        <p:nvSpPr>
-          <p:cNvPr id="4" name="Rectangle 3"/>
-          <p:cNvSpPr/>
-          <p:nvPr/>
-        </p:nvSpPr>
-        <p:spPr>
-          <a:xfrm>
-            <a:off x="221508" y="5733256"/>
-            <a:ext cx="8711872" cy="861774"/>
-          </a:xfrm>
-          <a:prstGeom prst="rect">
-            <a:avLst/>
-          </a:prstGeom>
-          <a:noFill/>
-        </p:spPr>
-        <p:txBody>
-          <a:bodyPr wrap="none" lIns="91440" tIns="45720" rIns="91440" bIns="45720">
-            <a:spAutoFit/>
-          </a:bodyPr>
-          <a:lstStyle/>
-          <a:p>
-            <a:pPr algn="ctr"/>
-            <a:r>
-              <a:rPr lang="en-US" sz="5000" b="0" cap="none" spc="0" dirty="0" smtClean="0">
-                <a:ln w="0"/>
-                <a:solidFill>
-                  <a:schemeClr val="tx1"/>
-                </a:solidFill>
-                <a:effectLst>
-                  <a:outerShdw blurRad="38100" dist="19050" dir="2700000" algn="tl" rotWithShape="0">
-                    <a:schemeClr val="dk1">
-                      <a:alpha val="40000"/>
-                    </a:schemeClr>
-                  </a:outerShdw>
-                </a:effectLst>
-              </a:rPr>
-              <a:t>It’s a TRANSFERABLE SKILL</a:t>
-            </a:r>
-            <a:endParaRPr lang="en-US" sz="5000" b="0" cap="none" spc="0" dirty="0">
-              <a:ln w="0"/>
-              <a:solidFill>
-                <a:schemeClr val="tx1"/>
-              </a:solidFill>
-              <a:effectLst>
-                <a:outerShdw blurRad="38100" dist="19050" dir="2700000" algn="tl" rotWithShape="0">
-                  <a:schemeClr val="dk1">
-                    <a:alpha val="40000"/>
-                  </a:schemeClr>
-                </a:outerShdw>
-              </a:effectLst>
-            </a:endParaRPr>
           </a:p>
         </p:txBody>
       </p:sp>
@@ -38017,80 +37943,9 @@
   <p:timing>
     <p:tnLst>
       <p:par>
-        <p:cTn id="1" dur="indefinite" restart="never" nodeType="tmRoot">
-          <p:childTnLst>
-            <p:seq concurrent="1" nextAc="seek">
-              <p:cTn id="2" dur="indefinite" nodeType="mainSeq">
-                <p:childTnLst>
-                  <p:par>
-                    <p:cTn id="3" fill="hold">
-                      <p:stCondLst>
-                        <p:cond delay="indefinite"/>
-                      </p:stCondLst>
-                      <p:childTnLst>
-                        <p:par>
-                          <p:cTn id="4" fill="hold">
-                            <p:stCondLst>
-                              <p:cond delay="0"/>
-                            </p:stCondLst>
-                            <p:childTnLst>
-                              <p:par>
-                                <p:cTn id="5" presetID="1" presetClass="entr" presetSubtype="0" fill="hold" grpId="0" nodeType="clickEffect">
-                                  <p:stCondLst>
-                                    <p:cond delay="0"/>
-                                  </p:stCondLst>
-                                  <p:childTnLst>
-                                    <p:set>
-                                      <p:cBhvr>
-                                        <p:cTn id="6" dur="1" fill="hold">
-                                          <p:stCondLst>
-                                            <p:cond delay="0"/>
-                                          </p:stCondLst>
-                                        </p:cTn>
-                                        <p:tgtEl>
-                                          <p:spTgt spid="4"/>
-                                        </p:tgtEl>
-                                        <p:attrNameLst>
-                                          <p:attrName>style.visibility</p:attrName>
-                                        </p:attrNameLst>
-                                      </p:cBhvr>
-                                      <p:to>
-                                        <p:strVal val="visible"/>
-                                      </p:to>
-                                    </p:set>
-                                  </p:childTnLst>
-                                </p:cTn>
-                              </p:par>
-                            </p:childTnLst>
-                          </p:cTn>
-                        </p:par>
-                      </p:childTnLst>
-                    </p:cTn>
-                  </p:par>
-                </p:childTnLst>
-              </p:cTn>
-              <p:prevCondLst>
-                <p:cond evt="onPrev" delay="0">
-                  <p:tgtEl>
-                    <p:sldTgt/>
-                  </p:tgtEl>
-                </p:cond>
-              </p:prevCondLst>
-              <p:nextCondLst>
-                <p:cond evt="onNext" delay="0">
-                  <p:tgtEl>
-                    <p:sldTgt/>
-                  </p:tgtEl>
-                </p:cond>
-              </p:nextCondLst>
-            </p:seq>
-          </p:childTnLst>
-        </p:cTn>
+        <p:cTn id="1" dur="indefinite" restart="never" nodeType="tmRoot"/>
       </p:par>
     </p:tnLst>
-    <p:bldLst>
-      <p:bldP spid="4" grpId="0"/>
-    </p:bldLst>
   </p:timing>
 </p:sld>
 </file>
@@ -38559,7 +38414,15 @@
           <a:p>
             <a:r>
               <a:rPr lang="en-GB" dirty="0" smtClean="0"/>
-              <a:t>There are MANY tutorials but the one we have had most consistency with is:</a:t>
+              <a:t>There are MANY tutorials but the one we have had most </a:t>
+            </a:r>
+            <a:r>
+              <a:rPr lang="en-GB" dirty="0" smtClean="0"/>
+              <a:t>consistency good results </a:t>
+            </a:r>
+            <a:r>
+              <a:rPr lang="en-GB" dirty="0" smtClean="0"/>
+              <a:t>with is:</a:t>
             </a:r>
           </a:p>
           <a:p>
@@ -38588,7 +38451,11 @@
           <a:p>
             <a:r>
               <a:rPr lang="en-GB" dirty="0" smtClean="0"/>
-              <a:t>We have created an empty project which is set up for Electron and React. If you are interested we can share it.</a:t>
+              <a:t>We have created an empty project which is set up for Electron and React. If you are interested we can share </a:t>
+            </a:r>
+            <a:r>
+              <a:rPr lang="en-GB" dirty="0" smtClean="0"/>
+              <a:t>it. Hopefully with Git being adopted we will be able to place a blank electron app there for anyone to pull and have a head start.</a:t>
             </a:r>
             <a:endParaRPr lang="en-GB" dirty="0"/>
           </a:p>
@@ -38682,7 +38549,11 @@
           <a:p>
             <a:r>
               <a:rPr lang="en-GB" dirty="0" smtClean="0"/>
-              <a:t>We have tried </a:t>
+              <a:t>We have </a:t>
+            </a:r>
+            <a:r>
+              <a:rPr lang="en-GB" dirty="0" smtClean="0"/>
+              <a:t>tried </a:t>
             </a:r>
           </a:p>
           <a:p>

</xml_diff>